<commit_message>
Redesign the logo and modify the subheading margin
</commit_message>
<xml_diff>
--- a/logo.pptx
+++ b/logo.pptx
@@ -5,13 +5,14 @@
     <p:sldMasterId id="2147483648" r:id="rId1"/>
   </p:sldMasterIdLst>
   <p:notesMasterIdLst>
-    <p:notesMasterId r:id="rId4"/>
+    <p:notesMasterId r:id="rId5"/>
   </p:notesMasterIdLst>
   <p:handoutMasterIdLst>
-    <p:handoutMasterId r:id="rId5"/>
+    <p:handoutMasterId r:id="rId6"/>
   </p:handoutMasterIdLst>
   <p:sldIdLst>
     <p:sldId id="369" r:id="rId3"/>
+    <p:sldId id="370" r:id="rId4"/>
   </p:sldIdLst>
   <p:sldSz cx="9144000" cy="6858000" type="screen4x3"/>
   <p:notesSz cx="6858000" cy="9144000"/>
@@ -143,7 +144,7 @@
   <p:extLst>
     <p:ext uri="{EFAFB233-063F-42B5-8137-9DF3F51BA10A}">
       <p15:sldGuideLst xmlns:p15="http://schemas.microsoft.com/office/powerpoint/2012/main">
-        <p15:guide id="1" orient="horz" pos="2161" userDrawn="1">
+        <p15:guide id="1" orient="horz" pos="2159" userDrawn="1">
           <p15:clr>
             <a:srgbClr val="A4A3A4"/>
           </p15:clr>
@@ -4877,9 +4878,9 @@
         <p:grpSpPr>
           <a:xfrm rot="0">
             <a:off x="3028950" y="1348740"/>
-            <a:ext cx="3069590" cy="3064510"/>
+            <a:ext cx="3069485" cy="3064510"/>
             <a:chOff x="5076056" y="2717020"/>
-            <a:chExt cx="3331157" cy="3325373"/>
+            <a:chExt cx="3331043" cy="3325373"/>
           </a:xfrm>
         </p:grpSpPr>
         <p:sp>
@@ -5059,7 +5060,7 @@
           </p:nvSpPr>
           <p:spPr>
             <a:xfrm rot="19403510">
-              <a:off x="5656813" y="3291992"/>
+              <a:off x="5656699" y="3291992"/>
               <a:ext cx="2750400" cy="2750401"/>
             </a:xfrm>
             <a:prstGeom prst="rect">
@@ -5161,6 +5162,186 @@
           </a:p>
         </p:txBody>
       </p:sp>
+    </p:spTree>
+  </p:cSld>
+  <p:clrMapOvr>
+    <a:masterClrMapping/>
+  </p:clrMapOvr>
+</p:sld>
+</file>
+
+<file path=ppt/slides/slide2.xml><?xml version="1.0" encoding="utf-8"?>
+<p:sld xmlns:a="http://schemas.openxmlformats.org/drawingml/2006/main" xmlns:r="http://schemas.openxmlformats.org/officeDocument/2006/relationships" xmlns:p="http://schemas.openxmlformats.org/presentationml/2006/main">
+  <p:cSld>
+    <p:spTree>
+      <p:nvGrpSpPr>
+        <p:cNvPr id="1" name=""/>
+        <p:cNvGrpSpPr/>
+        <p:nvPr/>
+      </p:nvGrpSpPr>
+      <p:grpSpPr/>
+      <p:grpSp>
+        <p:nvGrpSpPr>
+          <p:cNvPr id="11" name="组合 10"/>
+          <p:cNvGrpSpPr/>
+          <p:nvPr/>
+        </p:nvGrpSpPr>
+        <p:grpSpPr>
+          <a:xfrm>
+            <a:off x="3060065" y="1701165"/>
+            <a:ext cx="3312160" cy="3312160"/>
+            <a:chOff x="4705" y="1999"/>
+            <a:chExt cx="5216" cy="5216"/>
+          </a:xfrm>
+        </p:grpSpPr>
+        <p:sp>
+          <p:nvSpPr>
+            <p:cNvPr id="10" name="椭圆 9"/>
+            <p:cNvSpPr/>
+            <p:nvPr/>
+          </p:nvSpPr>
+          <p:spPr>
+            <a:xfrm>
+              <a:off x="5272" y="2565"/>
+              <a:ext cx="4195" cy="4195"/>
+            </a:xfrm>
+            <a:prstGeom prst="ellipse">
+              <a:avLst/>
+            </a:prstGeom>
+          </p:spPr>
+          <p:style>
+            <a:lnRef idx="2">
+              <a:schemeClr val="accent1">
+                <a:lumMod val="75000"/>
+              </a:schemeClr>
+            </a:lnRef>
+            <a:fillRef idx="1">
+              <a:schemeClr val="accent1"/>
+            </a:fillRef>
+            <a:effectRef idx="0">
+              <a:srgbClr val="FFFFFF"/>
+            </a:effectRef>
+            <a:fontRef idx="minor">
+              <a:schemeClr val="lt1"/>
+            </a:fontRef>
+          </p:style>
+          <p:txBody>
+            <a:bodyPr rtlCol="0" anchor="ctr"/>
+            <a:p>
+              <a:pPr algn="ctr"/>
+              <a:endParaRPr lang="zh-CN" altLang="en-US"/>
+            </a:p>
+          </p:txBody>
+        </p:sp>
+        <p:sp>
+          <p:nvSpPr>
+            <p:cNvPr id="8" name="同心圆 7"/>
+            <p:cNvSpPr/>
+            <p:nvPr/>
+          </p:nvSpPr>
+          <p:spPr>
+            <a:xfrm>
+              <a:off x="4705" y="1999"/>
+              <a:ext cx="5216" cy="5216"/>
+            </a:xfrm>
+            <a:prstGeom prst="donut">
+              <a:avLst>
+                <a:gd name="adj" fmla="val 12771"/>
+              </a:avLst>
+            </a:prstGeom>
+            <a:solidFill>
+              <a:schemeClr val="bg1">
+                <a:lumMod val="85000"/>
+              </a:schemeClr>
+            </a:solidFill>
+            <a:ln w="28575">
+              <a:solidFill>
+                <a:schemeClr val="tx1"/>
+              </a:solidFill>
+            </a:ln>
+          </p:spPr>
+          <p:style>
+            <a:lnRef idx="2">
+              <a:schemeClr val="accent1">
+                <a:lumMod val="75000"/>
+              </a:schemeClr>
+            </a:lnRef>
+            <a:fillRef idx="1">
+              <a:schemeClr val="accent1"/>
+            </a:fillRef>
+            <a:effectRef idx="0">
+              <a:srgbClr val="FFFFFF"/>
+            </a:effectRef>
+            <a:fontRef idx="minor">
+              <a:schemeClr val="lt1"/>
+            </a:fontRef>
+          </p:style>
+          <p:txBody>
+            <a:bodyPr rtlCol="0" anchor="ctr"/>
+            <a:p>
+              <a:pPr algn="ctr"/>
+              <a:r>
+                <a:rPr lang="en-US" altLang="zh-CN" sz="7200">
+                  <a:solidFill>
+                    <a:schemeClr val="bg1"/>
+                  </a:solidFill>
+                </a:rPr>
+                <a:t>GRC</a:t>
+              </a:r>
+              <a:endParaRPr lang="en-US" altLang="zh-CN" sz="7200">
+                <a:solidFill>
+                  <a:schemeClr val="bg1"/>
+                </a:solidFill>
+              </a:endParaRPr>
+            </a:p>
+          </p:txBody>
+        </p:sp>
+        <p:sp>
+          <p:nvSpPr>
+            <p:cNvPr id="9" name="文本框 8"/>
+            <p:cNvSpPr txBox="1"/>
+            <p:nvPr/>
+          </p:nvSpPr>
+          <p:spPr>
+            <a:xfrm>
+              <a:off x="5045" y="2339"/>
+              <a:ext cx="4485" cy="4485"/>
+            </a:xfrm>
+            <a:prstGeom prst="rect">
+              <a:avLst/>
+            </a:prstGeom>
+            <a:noFill/>
+          </p:spPr>
+          <p:txBody>
+            <a:bodyPr wrap="square" rtlCol="0">
+              <a:prstTxWarp prst="textCircle">
+                <a:avLst/>
+              </a:prstTxWarp>
+              <a:noAutofit/>
+            </a:bodyPr>
+            <a:p>
+              <a:pPr algn="ctr"/>
+              <a:r>
+                <a:rPr lang="en-US" altLang="zh-CN" sz="2400" b="1">
+                  <a:solidFill>
+                    <a:schemeClr val="tx2"/>
+                  </a:solidFill>
+                  <a:latin typeface="Arial Bold" panose="020B0604020202090204" charset="0"/>
+                  <a:cs typeface="Arial Bold" panose="020B0604020202090204" charset="0"/>
+                </a:rPr>
+                <a:t>Governance      Risk Managerment      Compliance      Audit</a:t>
+              </a:r>
+              <a:endParaRPr lang="en-US" altLang="zh-CN" sz="2400" b="1">
+                <a:solidFill>
+                  <a:schemeClr val="tx2"/>
+                </a:solidFill>
+                <a:latin typeface="Arial Bold" panose="020B0604020202090204" charset="0"/>
+                <a:cs typeface="Arial Bold" panose="020B0604020202090204" charset="0"/>
+              </a:endParaRPr>
+            </a:p>
+          </p:txBody>
+        </p:sp>
+      </p:grpSp>
     </p:spTree>
   </p:cSld>
   <p:clrMapOvr>

</xml_diff>